<commit_message>
added more comments and updated presentation --- DONE
</commit_message>
<xml_diff>
--- a/Final_project/presentation.pptx
+++ b/Final_project/presentation.pptx
@@ -225,7 +225,7 @@
           <a:p>
             <a:fld id="{71BACA97-DCC5-D741-8303-D68B06D997A0}" type="datetimeFigureOut">
               <a:rPr lang="sv-SE" smtClean="0"/>
-              <a:t>2024-05-07</a:t>
+              <a:t>2024-05-09</a:t>
             </a:fld>
             <a:endParaRPr lang="sv-SE"/>
           </a:p>
@@ -796,7 +796,7 @@
           <a:p>
             <a:fld id="{369C0258-E083-684F-B81E-2491FB4EFBD1}" type="datetime1">
               <a:rPr lang="sv-SE" smtClean="0"/>
-              <a:t>2024-05-07</a:t>
+              <a:t>2024-05-09</a:t>
             </a:fld>
             <a:endParaRPr lang="sv-SE"/>
           </a:p>
@@ -1138,7 +1138,7 @@
           <a:p>
             <a:fld id="{08C894E9-0885-714C-A367-BDC2DC59BB91}" type="datetime1">
               <a:rPr lang="sv-SE" smtClean="0"/>
-              <a:t>2024-05-07</a:t>
+              <a:t>2024-05-09</a:t>
             </a:fld>
             <a:endParaRPr lang="sv-SE"/>
           </a:p>
@@ -1572,7 +1572,7 @@
           <a:p>
             <a:fld id="{E926FF3D-704F-D246-9E92-4739AF4BF32C}" type="datetime1">
               <a:rPr lang="sv-SE" smtClean="0"/>
-              <a:t>2024-05-07</a:t>
+              <a:t>2024-05-09</a:t>
             </a:fld>
             <a:endParaRPr lang="sv-SE"/>
           </a:p>
@@ -1785,7 +1785,7 @@
           <a:p>
             <a:fld id="{31CF0965-93C0-9548-8879-5851BCBC049F}" type="datetime1">
               <a:rPr lang="sv-SE" smtClean="0"/>
-              <a:t>2024-05-07</a:t>
+              <a:t>2024-05-09</a:t>
             </a:fld>
             <a:endParaRPr lang="sv-SE"/>
           </a:p>
@@ -2031,7 +2031,7 @@
           <a:p>
             <a:fld id="{E2AD36EE-D7EC-624A-BB6C-F8DADCB0E6B6}" type="datetime1">
               <a:rPr lang="sv-SE" smtClean="0"/>
-              <a:t>2024-05-07</a:t>
+              <a:t>2024-05-09</a:t>
             </a:fld>
             <a:endParaRPr lang="sv-SE"/>
           </a:p>
@@ -2272,7 +2272,7 @@
           <a:p>
             <a:fld id="{CEEB1428-F34F-9743-B7C9-0212F6B23615}" type="datetime1">
               <a:rPr lang="sv-SE" smtClean="0"/>
-              <a:t>2024-05-07</a:t>
+              <a:t>2024-05-09</a:t>
             </a:fld>
             <a:endParaRPr lang="sv-SE"/>
           </a:p>
@@ -2526,7 +2526,7 @@
           <a:p>
             <a:fld id="{117AD585-73D1-4C4C-9D7C-030D27625895}" type="datetime1">
               <a:rPr lang="sv-SE" smtClean="0"/>
-              <a:t>2024-05-07</a:t>
+              <a:t>2024-05-09</a:t>
             </a:fld>
             <a:endParaRPr lang="sv-SE"/>
           </a:p>
@@ -2780,7 +2780,7 @@
           <a:p>
             <a:fld id="{07E8514D-D455-9E46-BC18-4265F6A85EC5}" type="datetime1">
               <a:rPr lang="sv-SE" smtClean="0"/>
-              <a:t>2024-05-07</a:t>
+              <a:t>2024-05-09</a:t>
             </a:fld>
             <a:endParaRPr lang="sv-SE"/>
           </a:p>
@@ -3051,7 +3051,7 @@
           <a:p>
             <a:fld id="{A67A58AE-A0B6-FF4E-B30B-64917FEAC316}" type="datetime1">
               <a:rPr lang="sv-SE" smtClean="0"/>
-              <a:t>2024-05-07</a:t>
+              <a:t>2024-05-09</a:t>
             </a:fld>
             <a:endParaRPr lang="sv-SE"/>
           </a:p>
@@ -3478,7 +3478,7 @@
           <a:p>
             <a:fld id="{3626A2DA-BD88-784C-A132-57FFB928491A}" type="datetime1">
               <a:rPr lang="sv-SE" smtClean="0"/>
-              <a:t>2024-05-07</a:t>
+              <a:t>2024-05-09</a:t>
             </a:fld>
             <a:endParaRPr lang="sv-SE"/>
           </a:p>
@@ -3764,7 +3764,7 @@
           <a:p>
             <a:fld id="{AC15C714-122B-4048-9D2D-1F5A3BEA504A}" type="datetime1">
               <a:rPr lang="sv-SE" smtClean="0"/>
-              <a:t>2024-05-07</a:t>
+              <a:t>2024-05-09</a:t>
             </a:fld>
             <a:endParaRPr lang="sv-SE" dirty="0"/>
           </a:p>
@@ -4146,7 +4146,7 @@
           <a:p>
             <a:fld id="{D7F93862-881E-DF46-AD81-FDB1501BAD48}" type="datetime1">
               <a:rPr lang="sv-SE" smtClean="0"/>
-              <a:t>2024-05-07</a:t>
+              <a:t>2024-05-09</a:t>
             </a:fld>
             <a:endParaRPr lang="sv-SE"/>
           </a:p>
@@ -4623,7 +4623,7 @@
           <a:p>
             <a:fld id="{EE5E874D-60F8-8B45-B36B-3029A6FA7FCB}" type="datetime1">
               <a:rPr lang="sv-SE" smtClean="0"/>
-              <a:t>2024-05-07</a:t>
+              <a:t>2024-05-09</a:t>
             </a:fld>
             <a:endParaRPr lang="sv-SE" dirty="0"/>
           </a:p>
@@ -5085,7 +5085,7 @@
           <a:p>
             <a:fld id="{7FE3A002-8AA0-194E-81B1-1ADE5B52840E}" type="datetime1">
               <a:rPr lang="sv-SE" smtClean="0"/>
-              <a:t>2024-05-07</a:t>
+              <a:t>2024-05-09</a:t>
             </a:fld>
             <a:endParaRPr lang="sv-SE" dirty="0"/>
           </a:p>
@@ -5598,7 +5598,7 @@
           <a:p>
             <a:fld id="{B003E109-5503-A446-83DE-4F0349794E27}" type="datetime1">
               <a:rPr lang="sv-SE" smtClean="0"/>
-              <a:t>2024-05-07</a:t>
+              <a:t>2024-05-09</a:t>
             </a:fld>
             <a:endParaRPr lang="sv-SE" dirty="0"/>
           </a:p>
@@ -6096,7 +6096,7 @@
           <a:p>
             <a:fld id="{1F9706F9-3770-3C47-9C0E-E405B1F87DBD}" type="datetime1">
               <a:rPr lang="sv-SE" smtClean="0"/>
-              <a:t>2024-05-07</a:t>
+              <a:t>2024-05-09</a:t>
             </a:fld>
             <a:endParaRPr lang="sv-SE" dirty="0"/>
           </a:p>
@@ -6558,7 +6558,7 @@
           <a:p>
             <a:fld id="{8E503FC7-D8F6-4243-8CCB-9A739180F56A}" type="datetime1">
               <a:rPr lang="sv-SE" smtClean="0"/>
-              <a:t>2024-05-07</a:t>
+              <a:t>2024-05-09</a:t>
             </a:fld>
             <a:endParaRPr lang="sv-SE" dirty="0"/>
           </a:p>
@@ -7020,7 +7020,7 @@
           <a:p>
             <a:fld id="{9719EDF7-C24A-7E4C-9EBB-98C778ECC35A}" type="datetime1">
               <a:rPr lang="sv-SE" smtClean="0"/>
-              <a:t>2024-05-07</a:t>
+              <a:t>2024-05-09</a:t>
             </a:fld>
             <a:endParaRPr lang="sv-SE" dirty="0"/>
           </a:p>
@@ -7482,7 +7482,7 @@
           <a:p>
             <a:fld id="{6DB96772-CADE-B345-804B-3DF93A11AE0A}" type="datetime1">
               <a:rPr lang="sv-SE" smtClean="0"/>
-              <a:t>2024-05-07</a:t>
+              <a:t>2024-05-09</a:t>
             </a:fld>
             <a:endParaRPr lang="sv-SE" dirty="0"/>
           </a:p>
@@ -7944,7 +7944,7 @@
           <a:p>
             <a:fld id="{669F8B43-28B6-0949-93DC-6B291391CFD4}" type="datetime1">
               <a:rPr lang="sv-SE" smtClean="0"/>
-              <a:t>2024-05-07</a:t>
+              <a:t>2024-05-09</a:t>
             </a:fld>
             <a:endParaRPr lang="sv-SE" dirty="0"/>
           </a:p>
@@ -8164,7 +8164,7 @@
           <a:p>
             <a:fld id="{3450A6BD-1EFB-BD42-9DC0-F0A6BEB4C27D}" type="datetime1">
               <a:rPr lang="sv-SE" smtClean="0"/>
-              <a:t>2024-05-07</a:t>
+              <a:t>2024-05-09</a:t>
             </a:fld>
             <a:endParaRPr lang="sv-SE"/>
           </a:p>
@@ -8455,7 +8455,7 @@
           <a:p>
             <a:fld id="{ADBDFCF2-2839-8D4F-B5E5-9B488CE2E4EE}" type="datetime1">
               <a:rPr lang="sv-SE" smtClean="0"/>
-              <a:t>2024-05-07</a:t>
+              <a:t>2024-05-09</a:t>
             </a:fld>
             <a:endParaRPr lang="sv-SE"/>
           </a:p>
@@ -8819,7 +8819,7 @@
           <a:p>
             <a:fld id="{A1A0D637-CC39-0F47-97F1-76AAE59A5700}" type="datetime1">
               <a:rPr lang="sv-SE" smtClean="0"/>
-              <a:t>2024-05-07</a:t>
+              <a:t>2024-05-09</a:t>
             </a:fld>
             <a:endParaRPr lang="sv-SE"/>
           </a:p>
@@ -9407,7 +9407,7 @@
           <a:p>
             <a:fld id="{47A9746E-62D8-944D-99B0-D98695592DCF}" type="datetime1">
               <a:rPr lang="sv-SE" smtClean="0"/>
-              <a:t>2024-05-07</a:t>
+              <a:t>2024-05-09</a:t>
             </a:fld>
             <a:endParaRPr lang="sv-SE"/>
           </a:p>
@@ -9771,7 +9771,7 @@
           <a:p>
             <a:fld id="{EC42A3C6-0141-7544-8502-44E44E5AD51F}" type="datetime1">
               <a:rPr lang="sv-SE" smtClean="0"/>
-              <a:t>2024-05-07</a:t>
+              <a:t>2024-05-09</a:t>
             </a:fld>
             <a:endParaRPr lang="sv-SE"/>
           </a:p>
@@ -10387,7 +10387,7 @@
           <a:p>
             <a:fld id="{5A8E03F6-2D99-9C4F-8DF5-D169CFDD1A0C}" type="datetime1">
               <a:rPr lang="sv-SE" smtClean="0"/>
-              <a:t>2024-05-07</a:t>
+              <a:t>2024-05-09</a:t>
             </a:fld>
             <a:endParaRPr lang="sv-SE"/>
           </a:p>
@@ -10824,7 +10824,7 @@
           <a:p>
             <a:fld id="{8AF63115-71BE-3E46-BB5A-A4600F1506C7}" type="datetime1">
               <a:rPr lang="sv-SE" smtClean="0"/>
-              <a:t>2024-05-07</a:t>
+              <a:t>2024-05-09</a:t>
             </a:fld>
             <a:endParaRPr lang="sv-SE"/>
           </a:p>
@@ -11597,7 +11597,7 @@
           <a:p>
             <a:fld id="{309FED66-59CE-6445-BA05-B37954B8CE47}" type="datetime1">
               <a:rPr lang="sv-SE" smtClean="0"/>
-              <a:t>2024-05-07</a:t>
+              <a:t>2024-05-09</a:t>
             </a:fld>
             <a:endParaRPr lang="sv-SE"/>
           </a:p>
@@ -11742,7 +11742,7 @@
           <a:p>
             <a:fld id="{8C332B6B-9A86-944B-B689-8453757791DF}" type="datetime1">
               <a:rPr lang="sv-SE" smtClean="0"/>
-              <a:t>2024-05-07</a:t>
+              <a:t>2024-05-09</a:t>
             </a:fld>
             <a:endParaRPr lang="sv-SE" dirty="0"/>
           </a:p>
@@ -11889,7 +11889,7 @@
           <a:p>
             <a:fld id="{1957E16A-1246-F744-BDA8-D5896FB385F8}" type="datetime1">
               <a:rPr lang="sv-SE" smtClean="0"/>
-              <a:t>2024-05-07</a:t>
+              <a:t>2024-05-09</a:t>
             </a:fld>
             <a:endParaRPr lang="sv-SE" dirty="0"/>
           </a:p>
@@ -12074,7 +12074,7 @@
           <a:p>
             <a:fld id="{68888E78-A3E8-2E47-A37C-B0DACC4AC38C}" type="datetime1">
               <a:rPr lang="sv-SE" smtClean="0"/>
-              <a:t>2024-05-07</a:t>
+              <a:t>2024-05-09</a:t>
             </a:fld>
             <a:endParaRPr lang="sv-SE" dirty="0"/>
           </a:p>
@@ -12267,7 +12267,7 @@
           <a:p>
             <a:fld id="{AC1801B8-2ABD-E645-B0F3-2F4D3FFFF5AE}" type="datetime1">
               <a:rPr lang="sv-SE" smtClean="0"/>
-              <a:t>2024-05-07</a:t>
+              <a:t>2024-05-09</a:t>
             </a:fld>
             <a:endParaRPr lang="sv-SE" dirty="0"/>
           </a:p>
@@ -12460,7 +12460,7 @@
           <a:p>
             <a:fld id="{164FA935-6078-184F-946C-D8B2130A7BC4}" type="datetime1">
               <a:rPr lang="sv-SE" smtClean="0"/>
-              <a:t>2024-05-07</a:t>
+              <a:t>2024-05-09</a:t>
             </a:fld>
             <a:endParaRPr lang="sv-SE" dirty="0"/>
           </a:p>
@@ -12821,7 +12821,7 @@
           <a:p>
             <a:fld id="{FC84D86F-77A2-B649-9DAB-4D28280CD96F}" type="datetime1">
               <a:rPr lang="sv-SE" smtClean="0"/>
-              <a:t>2024-05-07</a:t>
+              <a:t>2024-05-09</a:t>
             </a:fld>
             <a:endParaRPr lang="sv-SE"/>
           </a:p>
@@ -12937,7 +12937,7 @@
           <a:p>
             <a:fld id="{878DDE6C-6786-8C48-9317-AF0776715ACF}" type="datetime1">
               <a:rPr lang="sv-SE" smtClean="0"/>
-              <a:t>2024-05-07</a:t>
+              <a:t>2024-05-09</a:t>
             </a:fld>
             <a:endParaRPr lang="sv-SE"/>
           </a:p>
@@ -13154,7 +13154,7 @@
           <a:p>
             <a:fld id="{31CF0965-93C0-9548-8879-5851BCBC049F}" type="datetime1">
               <a:rPr lang="sv-SE" smtClean="0"/>
-              <a:t>2024-05-07</a:t>
+              <a:t>2024-05-09</a:t>
             </a:fld>
             <a:endParaRPr lang="sv-SE"/>
           </a:p>
@@ -13308,7 +13308,7 @@
           <a:p>
             <a:fld id="{31CF0965-93C0-9548-8879-5851BCBC049F}" type="datetime1">
               <a:rPr lang="sv-SE" smtClean="0"/>
-              <a:t>2024-05-07</a:t>
+              <a:t>2024-05-09</a:t>
             </a:fld>
             <a:endParaRPr lang="sv-SE"/>
           </a:p>
@@ -13476,7 +13476,7 @@
           <a:p>
             <a:fld id="{3A3328FD-6257-AC43-9CE4-2903A4D2BB9D}" type="datetime1">
               <a:rPr lang="sv-SE" smtClean="0"/>
-              <a:t>2024-05-07</a:t>
+              <a:t>2024-05-09</a:t>
             </a:fld>
             <a:endParaRPr lang="sv-SE" dirty="0"/>
           </a:p>
@@ -13738,7 +13738,7 @@
           <a:p>
             <a:fld id="{32BABC24-2A82-014C-9256-A51302708EE4}" type="datetime1">
               <a:rPr lang="sv-SE" smtClean="0"/>
-              <a:t>2024-05-07</a:t>
+              <a:t>2024-05-09</a:t>
             </a:fld>
             <a:endParaRPr lang="sv-SE" dirty="0"/>
           </a:p>
@@ -14043,7 +14043,7 @@
           <a:p>
             <a:fld id="{77AA192B-9140-F746-B429-ACF197DC5439}" type="datetime1">
               <a:rPr lang="sv-SE" smtClean="0"/>
-              <a:t>2024-05-07</a:t>
+              <a:t>2024-05-09</a:t>
             </a:fld>
             <a:endParaRPr lang="sv-SE" dirty="0"/>
           </a:p>
@@ -20258,7 +20258,7 @@
           <a:p>
             <a:fld id="{120FD48D-1F42-B341-AF85-AE480DB64991}" type="datetime1">
               <a:rPr lang="sv-SE" smtClean="0"/>
-              <a:t>2024-05-07</a:t>
+              <a:t>2024-05-09</a:t>
             </a:fld>
             <a:endParaRPr lang="sv-SE" dirty="0"/>
           </a:p>
@@ -20818,7 +20818,7 @@
           <a:p>
             <a:fld id="{45830D3C-297D-AF4B-BF84-42155CB091D6}" type="datetime1">
               <a:rPr lang="sv-SE" smtClean="0"/>
-              <a:t>2024-05-07</a:t>
+              <a:t>2024-05-09</a:t>
             </a:fld>
             <a:endParaRPr lang="sv-SE" dirty="0"/>
           </a:p>
@@ -21592,7 +21592,7 @@
           <a:p>
             <a:fld id="{275DBF22-A5DA-3B43-92C3-F6BCD51A4216}" type="datetime1">
               <a:rPr lang="sv-SE" smtClean="0"/>
-              <a:t>2024-05-07</a:t>
+              <a:t>2024-05-09</a:t>
             </a:fld>
             <a:endParaRPr lang="sv-SE"/>
           </a:p>
@@ -21913,7 +21913,7 @@
           <a:p>
             <a:fld id="{230F5ACA-7455-4642-BFE0-35A3360E2D3F}" type="datetime1">
               <a:rPr lang="sv-SE" smtClean="0"/>
-              <a:t>2024-05-07</a:t>
+              <a:t>2024-05-09</a:t>
             </a:fld>
             <a:endParaRPr lang="sv-SE"/>
           </a:p>
@@ -22300,7 +22300,7 @@
           <a:p>
             <a:fld id="{237029E1-9B44-DE43-98B9-EBAFD8B9E3F1}" type="datetime1">
               <a:rPr lang="sv-SE" smtClean="0"/>
-              <a:t>2024-05-07</a:t>
+              <a:t>2024-05-09</a:t>
             </a:fld>
             <a:endParaRPr lang="sv-SE"/>
           </a:p>
@@ -22643,7 +22643,7 @@
           <a:p>
             <a:fld id="{EECCBBAF-5C49-D145-9814-61A8103632A9}" type="datetime1">
               <a:rPr lang="sv-SE" smtClean="0"/>
-              <a:t>2024-05-07</a:t>
+              <a:t>2024-05-09</a:t>
             </a:fld>
             <a:endParaRPr lang="sv-SE"/>
           </a:p>
@@ -23072,7 +23072,7 @@
           <a:p>
             <a:fld id="{823D8581-A4D9-BE4A-AEA5-9282CF05EB42}" type="datetime1">
               <a:rPr lang="sv-SE" smtClean="0"/>
-              <a:t>2024-05-07</a:t>
+              <a:t>2024-05-09</a:t>
             </a:fld>
             <a:endParaRPr lang="sv-SE"/>
           </a:p>
@@ -23332,7 +23332,7 @@
           <a:p>
             <a:fld id="{888E4D63-BE2C-4D4B-BBD2-256262659A9F}" type="datetime1">
               <a:rPr lang="sv-SE" smtClean="0"/>
-              <a:t>2024-05-07</a:t>
+              <a:t>2024-05-09</a:t>
             </a:fld>
             <a:endParaRPr lang="sv-SE" dirty="0"/>
           </a:p>
@@ -24039,14 +24039,31 @@
             <p:ph type="subTitle" idx="1"/>
           </p:nvPr>
         </p:nvSpPr>
-        <p:spPr/>
-        <p:txBody>
-          <a:bodyPr/>
+        <p:spPr>
+          <a:xfrm>
+            <a:off x="124408" y="5226050"/>
+            <a:ext cx="11943184" cy="1398685"/>
+          </a:xfrm>
+        </p:spPr>
+        <p:txBody>
+          <a:bodyPr>
+            <a:normAutofit/>
+          </a:bodyPr>
           <a:lstStyle/>
           <a:p>
             <a:r>
               <a:rPr lang="sv-SE" dirty="0"/>
               <a:t>Theresa Hösl</a:t>
+            </a:r>
+          </a:p>
+          <a:p>
+            <a:r>
+              <a:rPr lang="sv-SE" dirty="0" err="1"/>
+              <a:t>Repository</a:t>
+            </a:r>
+            <a:r>
+              <a:rPr lang="sv-SE" dirty="0"/>
+              <a:t>: https://github.com/TheresaHoesl/PatternRecognition_MachineLearning/tree/main/Final_project</a:t>
             </a:r>
           </a:p>
         </p:txBody>
@@ -24628,7 +24645,19 @@
               <a:rPr lang="en-US" dirty="0">
                 <a:effectLst/>
               </a:rPr>
-              <a:t>Sequence of column vectors of length three captured by phone’s app while performing the activities.</a:t>
+              <a:t>Sequence of column vectors of length three (ax, ay, </a:t>
+            </a:r>
+            <a:r>
+              <a:rPr lang="en-US" dirty="0" err="1">
+                <a:effectLst/>
+              </a:rPr>
+              <a:t>az</a:t>
+            </a:r>
+            <a:r>
+              <a:rPr lang="en-US" dirty="0">
+                <a:effectLst/>
+              </a:rPr>
+              <a:t>) captured by phone’s app while performing the activities.</a:t>
             </a:r>
           </a:p>
           <a:p>
@@ -24993,6 +25022,14 @@
             <a:r>
               <a:rPr lang="de-DE" dirty="0"/>
               <a:t> </a:t>
+            </a:r>
+            <a:r>
+              <a:rPr lang="de-DE" dirty="0" err="1"/>
+              <a:t>for</a:t>
+            </a:r>
+            <a:r>
+              <a:rPr lang="de-DE" dirty="0"/>
+              <a:t> 5 sec </a:t>
             </a:r>
             <a:r>
               <a:rPr lang="en-US" dirty="0"/>
@@ -25919,7 +25956,7 @@
                     <a:ea typeface="+mn-ea"/>
                     <a:cs typeface="+mn-cs"/>
                   </a:rPr>
-                  <a:t>x,y,z</a:t>
+                  <a:t>ax,ay,az</a:t>
                 </a:r>
                 <a:r>
                   <a:rPr lang="en-GB" sz="2000" kern="1200" dirty="0">

</xml_diff>

<commit_message>
added new test results to presentation
</commit_message>
<xml_diff>
--- a/Final_project/presentation.pptx
+++ b/Final_project/presentation.pptx
@@ -225,7 +225,7 @@
           <a:p>
             <a:fld id="{71BACA97-DCC5-D741-8303-D68B06D997A0}" type="datetimeFigureOut">
               <a:rPr lang="sv-SE" smtClean="0"/>
-              <a:t>2024-05-09</a:t>
+              <a:t>2024-05-14</a:t>
             </a:fld>
             <a:endParaRPr lang="sv-SE"/>
           </a:p>
@@ -796,7 +796,7 @@
           <a:p>
             <a:fld id="{369C0258-E083-684F-B81E-2491FB4EFBD1}" type="datetime1">
               <a:rPr lang="sv-SE" smtClean="0"/>
-              <a:t>2024-05-09</a:t>
+              <a:t>2024-05-14</a:t>
             </a:fld>
             <a:endParaRPr lang="sv-SE"/>
           </a:p>
@@ -1138,7 +1138,7 @@
           <a:p>
             <a:fld id="{08C894E9-0885-714C-A367-BDC2DC59BB91}" type="datetime1">
               <a:rPr lang="sv-SE" smtClean="0"/>
-              <a:t>2024-05-09</a:t>
+              <a:t>2024-05-14</a:t>
             </a:fld>
             <a:endParaRPr lang="sv-SE"/>
           </a:p>
@@ -1572,7 +1572,7 @@
           <a:p>
             <a:fld id="{E926FF3D-704F-D246-9E92-4739AF4BF32C}" type="datetime1">
               <a:rPr lang="sv-SE" smtClean="0"/>
-              <a:t>2024-05-09</a:t>
+              <a:t>2024-05-14</a:t>
             </a:fld>
             <a:endParaRPr lang="sv-SE"/>
           </a:p>
@@ -1785,7 +1785,7 @@
           <a:p>
             <a:fld id="{31CF0965-93C0-9548-8879-5851BCBC049F}" type="datetime1">
               <a:rPr lang="sv-SE" smtClean="0"/>
-              <a:t>2024-05-09</a:t>
+              <a:t>2024-05-14</a:t>
             </a:fld>
             <a:endParaRPr lang="sv-SE"/>
           </a:p>
@@ -2031,7 +2031,7 @@
           <a:p>
             <a:fld id="{E2AD36EE-D7EC-624A-BB6C-F8DADCB0E6B6}" type="datetime1">
               <a:rPr lang="sv-SE" smtClean="0"/>
-              <a:t>2024-05-09</a:t>
+              <a:t>2024-05-14</a:t>
             </a:fld>
             <a:endParaRPr lang="sv-SE"/>
           </a:p>
@@ -2272,7 +2272,7 @@
           <a:p>
             <a:fld id="{CEEB1428-F34F-9743-B7C9-0212F6B23615}" type="datetime1">
               <a:rPr lang="sv-SE" smtClean="0"/>
-              <a:t>2024-05-09</a:t>
+              <a:t>2024-05-14</a:t>
             </a:fld>
             <a:endParaRPr lang="sv-SE"/>
           </a:p>
@@ -2526,7 +2526,7 @@
           <a:p>
             <a:fld id="{117AD585-73D1-4C4C-9D7C-030D27625895}" type="datetime1">
               <a:rPr lang="sv-SE" smtClean="0"/>
-              <a:t>2024-05-09</a:t>
+              <a:t>2024-05-14</a:t>
             </a:fld>
             <a:endParaRPr lang="sv-SE"/>
           </a:p>
@@ -2780,7 +2780,7 @@
           <a:p>
             <a:fld id="{07E8514D-D455-9E46-BC18-4265F6A85EC5}" type="datetime1">
               <a:rPr lang="sv-SE" smtClean="0"/>
-              <a:t>2024-05-09</a:t>
+              <a:t>2024-05-14</a:t>
             </a:fld>
             <a:endParaRPr lang="sv-SE"/>
           </a:p>
@@ -3051,7 +3051,7 @@
           <a:p>
             <a:fld id="{A67A58AE-A0B6-FF4E-B30B-64917FEAC316}" type="datetime1">
               <a:rPr lang="sv-SE" smtClean="0"/>
-              <a:t>2024-05-09</a:t>
+              <a:t>2024-05-14</a:t>
             </a:fld>
             <a:endParaRPr lang="sv-SE"/>
           </a:p>
@@ -3478,7 +3478,7 @@
           <a:p>
             <a:fld id="{3626A2DA-BD88-784C-A132-57FFB928491A}" type="datetime1">
               <a:rPr lang="sv-SE" smtClean="0"/>
-              <a:t>2024-05-09</a:t>
+              <a:t>2024-05-14</a:t>
             </a:fld>
             <a:endParaRPr lang="sv-SE"/>
           </a:p>
@@ -3764,7 +3764,7 @@
           <a:p>
             <a:fld id="{AC15C714-122B-4048-9D2D-1F5A3BEA504A}" type="datetime1">
               <a:rPr lang="sv-SE" smtClean="0"/>
-              <a:t>2024-05-09</a:t>
+              <a:t>2024-05-14</a:t>
             </a:fld>
             <a:endParaRPr lang="sv-SE" dirty="0"/>
           </a:p>
@@ -4146,7 +4146,7 @@
           <a:p>
             <a:fld id="{D7F93862-881E-DF46-AD81-FDB1501BAD48}" type="datetime1">
               <a:rPr lang="sv-SE" smtClean="0"/>
-              <a:t>2024-05-09</a:t>
+              <a:t>2024-05-14</a:t>
             </a:fld>
             <a:endParaRPr lang="sv-SE"/>
           </a:p>
@@ -4623,7 +4623,7 @@
           <a:p>
             <a:fld id="{EE5E874D-60F8-8B45-B36B-3029A6FA7FCB}" type="datetime1">
               <a:rPr lang="sv-SE" smtClean="0"/>
-              <a:t>2024-05-09</a:t>
+              <a:t>2024-05-14</a:t>
             </a:fld>
             <a:endParaRPr lang="sv-SE" dirty="0"/>
           </a:p>
@@ -5085,7 +5085,7 @@
           <a:p>
             <a:fld id="{7FE3A002-8AA0-194E-81B1-1ADE5B52840E}" type="datetime1">
               <a:rPr lang="sv-SE" smtClean="0"/>
-              <a:t>2024-05-09</a:t>
+              <a:t>2024-05-14</a:t>
             </a:fld>
             <a:endParaRPr lang="sv-SE" dirty="0"/>
           </a:p>
@@ -5598,7 +5598,7 @@
           <a:p>
             <a:fld id="{B003E109-5503-A446-83DE-4F0349794E27}" type="datetime1">
               <a:rPr lang="sv-SE" smtClean="0"/>
-              <a:t>2024-05-09</a:t>
+              <a:t>2024-05-14</a:t>
             </a:fld>
             <a:endParaRPr lang="sv-SE" dirty="0"/>
           </a:p>
@@ -6096,7 +6096,7 @@
           <a:p>
             <a:fld id="{1F9706F9-3770-3C47-9C0E-E405B1F87DBD}" type="datetime1">
               <a:rPr lang="sv-SE" smtClean="0"/>
-              <a:t>2024-05-09</a:t>
+              <a:t>2024-05-14</a:t>
             </a:fld>
             <a:endParaRPr lang="sv-SE" dirty="0"/>
           </a:p>
@@ -6558,7 +6558,7 @@
           <a:p>
             <a:fld id="{8E503FC7-D8F6-4243-8CCB-9A739180F56A}" type="datetime1">
               <a:rPr lang="sv-SE" smtClean="0"/>
-              <a:t>2024-05-09</a:t>
+              <a:t>2024-05-14</a:t>
             </a:fld>
             <a:endParaRPr lang="sv-SE" dirty="0"/>
           </a:p>
@@ -7020,7 +7020,7 @@
           <a:p>
             <a:fld id="{9719EDF7-C24A-7E4C-9EBB-98C778ECC35A}" type="datetime1">
               <a:rPr lang="sv-SE" smtClean="0"/>
-              <a:t>2024-05-09</a:t>
+              <a:t>2024-05-14</a:t>
             </a:fld>
             <a:endParaRPr lang="sv-SE" dirty="0"/>
           </a:p>
@@ -7482,7 +7482,7 @@
           <a:p>
             <a:fld id="{6DB96772-CADE-B345-804B-3DF93A11AE0A}" type="datetime1">
               <a:rPr lang="sv-SE" smtClean="0"/>
-              <a:t>2024-05-09</a:t>
+              <a:t>2024-05-14</a:t>
             </a:fld>
             <a:endParaRPr lang="sv-SE" dirty="0"/>
           </a:p>
@@ -7944,7 +7944,7 @@
           <a:p>
             <a:fld id="{669F8B43-28B6-0949-93DC-6B291391CFD4}" type="datetime1">
               <a:rPr lang="sv-SE" smtClean="0"/>
-              <a:t>2024-05-09</a:t>
+              <a:t>2024-05-14</a:t>
             </a:fld>
             <a:endParaRPr lang="sv-SE" dirty="0"/>
           </a:p>
@@ -8164,7 +8164,7 @@
           <a:p>
             <a:fld id="{3450A6BD-1EFB-BD42-9DC0-F0A6BEB4C27D}" type="datetime1">
               <a:rPr lang="sv-SE" smtClean="0"/>
-              <a:t>2024-05-09</a:t>
+              <a:t>2024-05-14</a:t>
             </a:fld>
             <a:endParaRPr lang="sv-SE"/>
           </a:p>
@@ -8455,7 +8455,7 @@
           <a:p>
             <a:fld id="{ADBDFCF2-2839-8D4F-B5E5-9B488CE2E4EE}" type="datetime1">
               <a:rPr lang="sv-SE" smtClean="0"/>
-              <a:t>2024-05-09</a:t>
+              <a:t>2024-05-14</a:t>
             </a:fld>
             <a:endParaRPr lang="sv-SE"/>
           </a:p>
@@ -8819,7 +8819,7 @@
           <a:p>
             <a:fld id="{A1A0D637-CC39-0F47-97F1-76AAE59A5700}" type="datetime1">
               <a:rPr lang="sv-SE" smtClean="0"/>
-              <a:t>2024-05-09</a:t>
+              <a:t>2024-05-14</a:t>
             </a:fld>
             <a:endParaRPr lang="sv-SE"/>
           </a:p>
@@ -9407,7 +9407,7 @@
           <a:p>
             <a:fld id="{47A9746E-62D8-944D-99B0-D98695592DCF}" type="datetime1">
               <a:rPr lang="sv-SE" smtClean="0"/>
-              <a:t>2024-05-09</a:t>
+              <a:t>2024-05-14</a:t>
             </a:fld>
             <a:endParaRPr lang="sv-SE"/>
           </a:p>
@@ -9771,7 +9771,7 @@
           <a:p>
             <a:fld id="{EC42A3C6-0141-7544-8502-44E44E5AD51F}" type="datetime1">
               <a:rPr lang="sv-SE" smtClean="0"/>
-              <a:t>2024-05-09</a:t>
+              <a:t>2024-05-14</a:t>
             </a:fld>
             <a:endParaRPr lang="sv-SE"/>
           </a:p>
@@ -10387,7 +10387,7 @@
           <a:p>
             <a:fld id="{5A8E03F6-2D99-9C4F-8DF5-D169CFDD1A0C}" type="datetime1">
               <a:rPr lang="sv-SE" smtClean="0"/>
-              <a:t>2024-05-09</a:t>
+              <a:t>2024-05-14</a:t>
             </a:fld>
             <a:endParaRPr lang="sv-SE"/>
           </a:p>
@@ -10824,7 +10824,7 @@
           <a:p>
             <a:fld id="{8AF63115-71BE-3E46-BB5A-A4600F1506C7}" type="datetime1">
               <a:rPr lang="sv-SE" smtClean="0"/>
-              <a:t>2024-05-09</a:t>
+              <a:t>2024-05-14</a:t>
             </a:fld>
             <a:endParaRPr lang="sv-SE"/>
           </a:p>
@@ -11597,7 +11597,7 @@
           <a:p>
             <a:fld id="{309FED66-59CE-6445-BA05-B37954B8CE47}" type="datetime1">
               <a:rPr lang="sv-SE" smtClean="0"/>
-              <a:t>2024-05-09</a:t>
+              <a:t>2024-05-14</a:t>
             </a:fld>
             <a:endParaRPr lang="sv-SE"/>
           </a:p>
@@ -11742,7 +11742,7 @@
           <a:p>
             <a:fld id="{8C332B6B-9A86-944B-B689-8453757791DF}" type="datetime1">
               <a:rPr lang="sv-SE" smtClean="0"/>
-              <a:t>2024-05-09</a:t>
+              <a:t>2024-05-14</a:t>
             </a:fld>
             <a:endParaRPr lang="sv-SE" dirty="0"/>
           </a:p>
@@ -11889,7 +11889,7 @@
           <a:p>
             <a:fld id="{1957E16A-1246-F744-BDA8-D5896FB385F8}" type="datetime1">
               <a:rPr lang="sv-SE" smtClean="0"/>
-              <a:t>2024-05-09</a:t>
+              <a:t>2024-05-14</a:t>
             </a:fld>
             <a:endParaRPr lang="sv-SE" dirty="0"/>
           </a:p>
@@ -12074,7 +12074,7 @@
           <a:p>
             <a:fld id="{68888E78-A3E8-2E47-A37C-B0DACC4AC38C}" type="datetime1">
               <a:rPr lang="sv-SE" smtClean="0"/>
-              <a:t>2024-05-09</a:t>
+              <a:t>2024-05-14</a:t>
             </a:fld>
             <a:endParaRPr lang="sv-SE" dirty="0"/>
           </a:p>
@@ -12267,7 +12267,7 @@
           <a:p>
             <a:fld id="{AC1801B8-2ABD-E645-B0F3-2F4D3FFFF5AE}" type="datetime1">
               <a:rPr lang="sv-SE" smtClean="0"/>
-              <a:t>2024-05-09</a:t>
+              <a:t>2024-05-14</a:t>
             </a:fld>
             <a:endParaRPr lang="sv-SE" dirty="0"/>
           </a:p>
@@ -12460,7 +12460,7 @@
           <a:p>
             <a:fld id="{164FA935-6078-184F-946C-D8B2130A7BC4}" type="datetime1">
               <a:rPr lang="sv-SE" smtClean="0"/>
-              <a:t>2024-05-09</a:t>
+              <a:t>2024-05-14</a:t>
             </a:fld>
             <a:endParaRPr lang="sv-SE" dirty="0"/>
           </a:p>
@@ -12821,7 +12821,7 @@
           <a:p>
             <a:fld id="{FC84D86F-77A2-B649-9DAB-4D28280CD96F}" type="datetime1">
               <a:rPr lang="sv-SE" smtClean="0"/>
-              <a:t>2024-05-09</a:t>
+              <a:t>2024-05-14</a:t>
             </a:fld>
             <a:endParaRPr lang="sv-SE"/>
           </a:p>
@@ -12937,7 +12937,7 @@
           <a:p>
             <a:fld id="{878DDE6C-6786-8C48-9317-AF0776715ACF}" type="datetime1">
               <a:rPr lang="sv-SE" smtClean="0"/>
-              <a:t>2024-05-09</a:t>
+              <a:t>2024-05-14</a:t>
             </a:fld>
             <a:endParaRPr lang="sv-SE"/>
           </a:p>
@@ -13154,7 +13154,7 @@
           <a:p>
             <a:fld id="{31CF0965-93C0-9548-8879-5851BCBC049F}" type="datetime1">
               <a:rPr lang="sv-SE" smtClean="0"/>
-              <a:t>2024-05-09</a:t>
+              <a:t>2024-05-14</a:t>
             </a:fld>
             <a:endParaRPr lang="sv-SE"/>
           </a:p>
@@ -13308,7 +13308,7 @@
           <a:p>
             <a:fld id="{31CF0965-93C0-9548-8879-5851BCBC049F}" type="datetime1">
               <a:rPr lang="sv-SE" smtClean="0"/>
-              <a:t>2024-05-09</a:t>
+              <a:t>2024-05-14</a:t>
             </a:fld>
             <a:endParaRPr lang="sv-SE"/>
           </a:p>
@@ -13476,7 +13476,7 @@
           <a:p>
             <a:fld id="{3A3328FD-6257-AC43-9CE4-2903A4D2BB9D}" type="datetime1">
               <a:rPr lang="sv-SE" smtClean="0"/>
-              <a:t>2024-05-09</a:t>
+              <a:t>2024-05-14</a:t>
             </a:fld>
             <a:endParaRPr lang="sv-SE" dirty="0"/>
           </a:p>
@@ -13738,7 +13738,7 @@
           <a:p>
             <a:fld id="{32BABC24-2A82-014C-9256-A51302708EE4}" type="datetime1">
               <a:rPr lang="sv-SE" smtClean="0"/>
-              <a:t>2024-05-09</a:t>
+              <a:t>2024-05-14</a:t>
             </a:fld>
             <a:endParaRPr lang="sv-SE" dirty="0"/>
           </a:p>
@@ -14043,7 +14043,7 @@
           <a:p>
             <a:fld id="{77AA192B-9140-F746-B429-ACF197DC5439}" type="datetime1">
               <a:rPr lang="sv-SE" smtClean="0"/>
-              <a:t>2024-05-09</a:t>
+              <a:t>2024-05-14</a:t>
             </a:fld>
             <a:endParaRPr lang="sv-SE" dirty="0"/>
           </a:p>
@@ -20258,7 +20258,7 @@
           <a:p>
             <a:fld id="{120FD48D-1F42-B341-AF85-AE480DB64991}" type="datetime1">
               <a:rPr lang="sv-SE" smtClean="0"/>
-              <a:t>2024-05-09</a:t>
+              <a:t>2024-05-14</a:t>
             </a:fld>
             <a:endParaRPr lang="sv-SE" dirty="0"/>
           </a:p>
@@ -20818,7 +20818,7 @@
           <a:p>
             <a:fld id="{45830D3C-297D-AF4B-BF84-42155CB091D6}" type="datetime1">
               <a:rPr lang="sv-SE" smtClean="0"/>
-              <a:t>2024-05-09</a:t>
+              <a:t>2024-05-14</a:t>
             </a:fld>
             <a:endParaRPr lang="sv-SE" dirty="0"/>
           </a:p>
@@ -21592,7 +21592,7 @@
           <a:p>
             <a:fld id="{275DBF22-A5DA-3B43-92C3-F6BCD51A4216}" type="datetime1">
               <a:rPr lang="sv-SE" smtClean="0"/>
-              <a:t>2024-05-09</a:t>
+              <a:t>2024-05-14</a:t>
             </a:fld>
             <a:endParaRPr lang="sv-SE"/>
           </a:p>
@@ -21913,7 +21913,7 @@
           <a:p>
             <a:fld id="{230F5ACA-7455-4642-BFE0-35A3360E2D3F}" type="datetime1">
               <a:rPr lang="sv-SE" smtClean="0"/>
-              <a:t>2024-05-09</a:t>
+              <a:t>2024-05-14</a:t>
             </a:fld>
             <a:endParaRPr lang="sv-SE"/>
           </a:p>
@@ -22300,7 +22300,7 @@
           <a:p>
             <a:fld id="{237029E1-9B44-DE43-98B9-EBAFD8B9E3F1}" type="datetime1">
               <a:rPr lang="sv-SE" smtClean="0"/>
-              <a:t>2024-05-09</a:t>
+              <a:t>2024-05-14</a:t>
             </a:fld>
             <a:endParaRPr lang="sv-SE"/>
           </a:p>
@@ -22643,7 +22643,7 @@
           <a:p>
             <a:fld id="{EECCBBAF-5C49-D145-9814-61A8103632A9}" type="datetime1">
               <a:rPr lang="sv-SE" smtClean="0"/>
-              <a:t>2024-05-09</a:t>
+              <a:t>2024-05-14</a:t>
             </a:fld>
             <a:endParaRPr lang="sv-SE"/>
           </a:p>
@@ -23072,7 +23072,7 @@
           <a:p>
             <a:fld id="{823D8581-A4D9-BE4A-AEA5-9282CF05EB42}" type="datetime1">
               <a:rPr lang="sv-SE" smtClean="0"/>
-              <a:t>2024-05-09</a:t>
+              <a:t>2024-05-14</a:t>
             </a:fld>
             <a:endParaRPr lang="sv-SE"/>
           </a:p>
@@ -23332,7 +23332,7 @@
           <a:p>
             <a:fld id="{888E4D63-BE2C-4D4B-BBD2-256262659A9F}" type="datetime1">
               <a:rPr lang="sv-SE" smtClean="0"/>
-              <a:t>2024-05-09</a:t>
+              <a:t>2024-05-14</a:t>
             </a:fld>
             <a:endParaRPr lang="sv-SE" dirty="0"/>
           </a:p>
@@ -24152,8 +24152,8 @@
         </p:nvSpPr>
         <p:spPr>
           <a:xfrm>
-            <a:off x="600075" y="1795850"/>
-            <a:ext cx="5314950" cy="4531923"/>
+            <a:off x="600075" y="1795851"/>
+            <a:ext cx="10990262" cy="1633150"/>
           </a:xfrm>
         </p:spPr>
         <p:txBody>
@@ -24172,7 +24172,7 @@
                 </a:solidFill>
                 <a:latin typeface="Arial" panose="020B0604020202020204" pitchFamily="34" charset="0"/>
               </a:rPr>
-              <a:t>For one sequence with alternating activities</a:t>
+              <a:t>For sequences with alternating activities</a:t>
             </a:r>
             <a:r>
               <a:rPr lang="en-GB" dirty="0"/>
@@ -24228,13 +24228,73 @@
         </p:blipFill>
         <p:spPr>
           <a:xfrm>
-            <a:off x="6275388" y="1971819"/>
-            <a:ext cx="5314950" cy="4179986"/>
+            <a:off x="600075" y="3560808"/>
+            <a:ext cx="3381796" cy="2659641"/>
           </a:xfrm>
           <a:prstGeom prst="rect">
             <a:avLst/>
           </a:prstGeom>
           <a:noFill/>
+        </p:spPr>
+      </p:pic>
+      <p:pic>
+        <p:nvPicPr>
+          <p:cNvPr id="5" name="Picture 4">
+            <a:extLst>
+              <a:ext uri="{FF2B5EF4-FFF2-40B4-BE49-F238E27FC236}">
+                <a16:creationId xmlns:a16="http://schemas.microsoft.com/office/drawing/2014/main" id="{D99F4752-FF44-8BA9-B13E-EB967D500D0E}"/>
+              </a:ext>
+            </a:extLst>
+          </p:cNvPr>
+          <p:cNvPicPr>
+            <a:picLocks noChangeAspect="1"/>
+          </p:cNvPicPr>
+          <p:nvPr/>
+        </p:nvPicPr>
+        <p:blipFill>
+          <a:blip r:embed="rId3"/>
+          <a:stretch>
+            <a:fillRect/>
+          </a:stretch>
+        </p:blipFill>
+        <p:spPr>
+          <a:xfrm>
+            <a:off x="8208541" y="3560049"/>
+            <a:ext cx="3382760" cy="2660400"/>
+          </a:xfrm>
+          <a:prstGeom prst="rect">
+            <a:avLst/>
+          </a:prstGeom>
+        </p:spPr>
+      </p:pic>
+      <p:pic>
+        <p:nvPicPr>
+          <p:cNvPr id="8" name="Picture 7" descr="A graph of blue lines&#10;&#10;Description automatically generated with medium confidence">
+            <a:extLst>
+              <a:ext uri="{FF2B5EF4-FFF2-40B4-BE49-F238E27FC236}">
+                <a16:creationId xmlns:a16="http://schemas.microsoft.com/office/drawing/2014/main" id="{DB738D14-2755-F97A-F35A-92A3588E7306}"/>
+              </a:ext>
+            </a:extLst>
+          </p:cNvPr>
+          <p:cNvPicPr>
+            <a:picLocks noChangeAspect="1"/>
+          </p:cNvPicPr>
+          <p:nvPr/>
+        </p:nvPicPr>
+        <p:blipFill>
+          <a:blip r:embed="rId4"/>
+          <a:stretch>
+            <a:fillRect/>
+          </a:stretch>
+        </p:blipFill>
+        <p:spPr>
+          <a:xfrm>
+            <a:off x="4403826" y="3560049"/>
+            <a:ext cx="3382760" cy="2660400"/>
+          </a:xfrm>
+          <a:prstGeom prst="rect">
+            <a:avLst/>
+          </a:prstGeom>
         </p:spPr>
       </p:pic>
     </p:spTree>
@@ -24962,7 +25022,7 @@
           <a:p>
             <a:r>
               <a:rPr lang="de-DE" dirty="0" err="1"/>
-              <a:t>One</a:t>
+              <a:t>Three</a:t>
             </a:r>
             <a:r>
               <a:rPr lang="de-DE" dirty="0"/>
@@ -24970,15 +25030,15 @@
             </a:r>
             <a:r>
               <a:rPr lang="de-DE" dirty="0" err="1"/>
-              <a:t>sequence</a:t>
+              <a:t>sequences</a:t>
             </a:r>
             <a:r>
               <a:rPr lang="de-DE" dirty="0"/>
-              <a:t> </a:t>
+              <a:t> in </a:t>
             </a:r>
             <a:r>
               <a:rPr lang="de-DE" dirty="0" err="1"/>
-              <a:t>where</a:t>
+              <a:t>which</a:t>
             </a:r>
             <a:r>
               <a:rPr lang="de-DE" dirty="0"/>

</xml_diff>